<commit_message>
Updated readme file for project.
</commit_message>
<xml_diff>
--- a/Healthcare_and_Covid19_NewStyle.pptx
+++ b/Healthcare_and_Covid19_NewStyle.pptx
@@ -5,46 +5,45 @@
     <p:sldMasterId id="2147483660" r:id="rId1"/>
   </p:sldMasterIdLst>
   <p:notesMasterIdLst>
-    <p:notesMasterId r:id="rId20"/>
+    <p:notesMasterId r:id="rId19"/>
   </p:notesMasterIdLst>
   <p:sldIdLst>
     <p:sldId id="256" r:id="rId2"/>
     <p:sldId id="305" r:id="rId3"/>
     <p:sldId id="306" r:id="rId4"/>
     <p:sldId id="259" r:id="rId5"/>
-    <p:sldId id="307" r:id="rId6"/>
-    <p:sldId id="308" r:id="rId7"/>
-    <p:sldId id="309" r:id="rId8"/>
-    <p:sldId id="302" r:id="rId9"/>
-    <p:sldId id="310" r:id="rId10"/>
-    <p:sldId id="299" r:id="rId11"/>
-    <p:sldId id="303" r:id="rId12"/>
-    <p:sldId id="295" r:id="rId13"/>
+    <p:sldId id="308" r:id="rId6"/>
+    <p:sldId id="309" r:id="rId7"/>
+    <p:sldId id="302" r:id="rId8"/>
+    <p:sldId id="310" r:id="rId9"/>
+    <p:sldId id="299" r:id="rId10"/>
+    <p:sldId id="303" r:id="rId11"/>
+    <p:sldId id="295" r:id="rId12"/>
+    <p:sldId id="311" r:id="rId13"/>
     <p:sldId id="296" r:id="rId14"/>
     <p:sldId id="300" r:id="rId15"/>
-    <p:sldId id="298" r:id="rId16"/>
-    <p:sldId id="301" r:id="rId17"/>
+    <p:sldId id="301" r:id="rId16"/>
+    <p:sldId id="312" r:id="rId17"/>
     <p:sldId id="293" r:id="rId18"/>
-    <p:sldId id="304" r:id="rId19"/>
   </p:sldIdLst>
   <p:sldSz cx="9144000" cy="5143500" type="screen16x9"/>
   <p:notesSz cx="6858000" cy="9144000"/>
   <p:embeddedFontLst>
     <p:embeddedFont>
       <p:font typeface="Abel" panose="020B0604020202020204" charset="0"/>
-      <p:regular r:id="rId21"/>
+      <p:regular r:id="rId20"/>
     </p:embeddedFont>
     <p:embeddedFont>
       <p:font typeface="Encode Sans Semi Condensed Light" panose="020B0604020202020204" charset="0"/>
-      <p:regular r:id="rId22"/>
-      <p:bold r:id="rId23"/>
+      <p:regular r:id="rId21"/>
+      <p:bold r:id="rId22"/>
     </p:embeddedFont>
     <p:embeddedFont>
       <p:font typeface="Segoe UI" panose="020B0502040204020203" pitchFamily="34" charset="0"/>
-      <p:regular r:id="rId24"/>
-      <p:bold r:id="rId25"/>
-      <p:italic r:id="rId26"/>
-      <p:boldItalic r:id="rId27"/>
+      <p:regular r:id="rId23"/>
+      <p:bold r:id="rId24"/>
+      <p:italic r:id="rId25"/>
+      <p:boldItalic r:id="rId26"/>
     </p:embeddedFont>
   </p:embeddedFontLst>
   <p:defaultTextStyle>
@@ -1378,7 +1377,7 @@
   <p:cSld>
     <p:spTree>
       <p:nvGrpSpPr>
-        <p:cNvPr id="1" name="Shape 191"/>
+        <p:cNvPr id="1" name="Shape 179"/>
         <p:cNvGrpSpPr/>
         <p:nvPr/>
       </p:nvGrpSpPr>
@@ -1392,7 +1391,7 @@
       </p:grpSpPr>
       <p:sp>
         <p:nvSpPr>
-          <p:cNvPr id="192" name="Google Shape;192;p:notes"/>
+          <p:cNvPr id="180" name="Google Shape;180;g35f391192_029:notes"/>
           <p:cNvSpPr>
             <a:spLocks noGrp="1" noRot="1" noChangeAspect="1"/>
           </p:cNvSpPr>
@@ -1433,7 +1432,7 @@
       </p:sp>
       <p:sp>
         <p:nvSpPr>
-          <p:cNvPr id="193" name="Google Shape;193;p:notes"/>
+          <p:cNvPr id="181" name="Google Shape;181;g35f391192_029:notes"/>
           <p:cNvSpPr txBox="1">
             <a:spLocks noGrp="1"/>
           </p:cNvSpPr>
@@ -1465,18 +1464,14 @@
               </a:spcAft>
               <a:buNone/>
             </a:pPr>
-            <a:r>
-              <a:rPr lang="en-US" dirty="0"/>
-              <a:t>Discuss Outliers</a:t>
-            </a:r>
-            <a:endParaRPr dirty="0"/>
+            <a:endParaRPr/>
           </a:p>
         </p:txBody>
       </p:sp>
     </p:spTree>
     <p:extLst>
       <p:ext uri="{BB962C8B-B14F-4D97-AF65-F5344CB8AC3E}">
-        <p14:creationId xmlns:p14="http://schemas.microsoft.com/office/powerpoint/2010/main" val="4290345760"/>
+        <p14:creationId xmlns:p14="http://schemas.microsoft.com/office/powerpoint/2010/main" val="3689045698"/>
       </p:ext>
     </p:extLst>
   </p:cSld>
@@ -1589,7 +1584,7 @@
     </p:spTree>
     <p:extLst>
       <p:ext uri="{BB962C8B-B14F-4D97-AF65-F5344CB8AC3E}">
-        <p14:creationId xmlns:p14="http://schemas.microsoft.com/office/powerpoint/2010/main" val="2697096157"/>
+        <p14:creationId xmlns:p14="http://schemas.microsoft.com/office/powerpoint/2010/main" val="4290345760"/>
       </p:ext>
     </p:extLst>
   </p:cSld>
@@ -1702,7 +1697,7 @@
     </p:spTree>
     <p:extLst>
       <p:ext uri="{BB962C8B-B14F-4D97-AF65-F5344CB8AC3E}">
-        <p14:creationId xmlns:p14="http://schemas.microsoft.com/office/powerpoint/2010/main" val="3501926511"/>
+        <p14:creationId xmlns:p14="http://schemas.microsoft.com/office/powerpoint/2010/main" val="2697096157"/>
       </p:ext>
     </p:extLst>
   </p:cSld>
@@ -5585,7 +5580,7 @@
   <p:cSld>
     <p:spTree>
       <p:nvGrpSpPr>
-        <p:cNvPr id="1" name=""/>
+        <p:cNvPr id="1" name="Shape 182"/>
         <p:cNvGrpSpPr/>
         <p:nvPr/>
       </p:nvGrpSpPr>
@@ -5599,14 +5594,118 @@
       </p:grpSpPr>
       <p:sp>
         <p:nvSpPr>
-          <p:cNvPr id="2" name="Title 1">
-            <a:extLst>
-              <a:ext uri="{FF2B5EF4-FFF2-40B4-BE49-F238E27FC236}">
-                <a16:creationId xmlns:a16="http://schemas.microsoft.com/office/drawing/2014/main" id="{5EBAAEE0-3B4E-408B-9FAC-7BBF803AA414}"/>
-              </a:ext>
-            </a:extLst>
-          </p:cNvPr>
-          <p:cNvSpPr>
+          <p:cNvPr id="183" name="Google Shape;183;p17"/>
+          <p:cNvSpPr txBox="1">
+            <a:spLocks noGrp="1"/>
+          </p:cNvSpPr>
+          <p:nvPr>
+            <p:ph type="ctrTitle"/>
+          </p:nvPr>
+        </p:nvSpPr>
+        <p:spPr>
+          <a:xfrm>
+            <a:off x="514800" y="2025549"/>
+            <a:ext cx="8114400" cy="1160995"/>
+          </a:xfrm>
+          <a:prstGeom prst="rect">
+            <a:avLst/>
+          </a:prstGeom>
+        </p:spPr>
+        <p:txBody>
+          <a:bodyPr spcFirstLastPara="1" wrap="square" lIns="0" tIns="0" rIns="0" bIns="0" anchor="b" anchorCtr="0">
+            <a:noAutofit/>
+          </a:bodyPr>
+          <a:lstStyle/>
+          <a:p>
+            <a:pPr marL="0" lvl="0" indent="0" algn="l" rtl="0">
+              <a:spcBef>
+                <a:spcPts val="0"/>
+              </a:spcBef>
+              <a:spcAft>
+                <a:spcPts val="0"/>
+              </a:spcAft>
+              <a:buNone/>
+            </a:pPr>
+            <a:r>
+              <a:rPr lang="en" sz="4800" dirty="0"/>
+              <a:t>Covid-19 Infection and Mortality Rates by Uninsured</a:t>
+            </a:r>
+            <a:endParaRPr dirty="0"/>
+          </a:p>
+        </p:txBody>
+      </p:sp>
+      <p:sp>
+        <p:nvSpPr>
+          <p:cNvPr id="184" name="Google Shape;184;p17"/>
+          <p:cNvSpPr txBox="1">
+            <a:spLocks noGrp="1"/>
+          </p:cNvSpPr>
+          <p:nvPr>
+            <p:ph type="subTitle" idx="1"/>
+          </p:nvPr>
+        </p:nvSpPr>
+        <p:spPr>
+          <a:xfrm>
+            <a:off x="514800" y="2702092"/>
+            <a:ext cx="8114400" cy="415800"/>
+          </a:xfrm>
+          <a:prstGeom prst="rect">
+            <a:avLst/>
+          </a:prstGeom>
+        </p:spPr>
+        <p:txBody>
+          <a:bodyPr spcFirstLastPara="1" wrap="square" lIns="0" tIns="0" rIns="0" bIns="0" anchor="t" anchorCtr="0">
+            <a:noAutofit/>
+          </a:bodyPr>
+          <a:lstStyle/>
+          <a:p>
+            <a:pPr marL="0" lvl="0" indent="0" algn="l" rtl="0">
+              <a:spcBef>
+                <a:spcPts val="0"/>
+              </a:spcBef>
+              <a:spcAft>
+                <a:spcPts val="0"/>
+              </a:spcAft>
+              <a:buNone/>
+            </a:pPr>
+            <a:endParaRPr dirty="0"/>
+          </a:p>
+        </p:txBody>
+      </p:sp>
+    </p:spTree>
+    <p:extLst>
+      <p:ext uri="{BB962C8B-B14F-4D97-AF65-F5344CB8AC3E}">
+        <p14:creationId xmlns:p14="http://schemas.microsoft.com/office/powerpoint/2010/main" val="1952650815"/>
+      </p:ext>
+    </p:extLst>
+  </p:cSld>
+  <p:clrMapOvr>
+    <a:masterClrMapping/>
+  </p:clrMapOvr>
+</p:sld>
+</file>
+
+<file path=ppt/slides/slide11.xml><?xml version="1.0" encoding="utf-8"?>
+<p:sld xmlns:a="http://schemas.openxmlformats.org/drawingml/2006/main" xmlns:r="http://schemas.openxmlformats.org/officeDocument/2006/relationships" xmlns:p="http://schemas.openxmlformats.org/presentationml/2006/main">
+  <p:cSld>
+    <p:spTree>
+      <p:nvGrpSpPr>
+        <p:cNvPr id="1" name="Shape 194"/>
+        <p:cNvGrpSpPr/>
+        <p:nvPr/>
+      </p:nvGrpSpPr>
+      <p:grpSpPr>
+        <a:xfrm>
+          <a:off x="0" y="0"/>
+          <a:ext cx="0" cy="0"/>
+          <a:chOff x="0" y="0"/>
+          <a:chExt cx="0" cy="0"/>
+        </a:xfrm>
+      </p:grpSpPr>
+      <p:sp>
+        <p:nvSpPr>
+          <p:cNvPr id="195" name="Google Shape;195;p19"/>
+          <p:cNvSpPr txBox="1">
             <a:spLocks noGrp="1"/>
           </p:cNvSpPr>
           <p:nvPr>
@@ -5616,94 +5715,83 @@
         <p:spPr>
           <a:xfrm>
             <a:off x="514799" y="130280"/>
-            <a:ext cx="8372891" cy="665100"/>
+            <a:ext cx="8177379" cy="665100"/>
           </a:xfrm>
+          <a:prstGeom prst="rect">
+            <a:avLst/>
+          </a:prstGeom>
         </p:spPr>
         <p:txBody>
-          <a:bodyPr/>
+          <a:bodyPr spcFirstLastPara="1" wrap="square" lIns="0" tIns="0" rIns="0" bIns="0" anchor="ctr" anchorCtr="0">
+            <a:noAutofit/>
+          </a:bodyPr>
           <a:lstStyle/>
           <a:p>
+            <a:pPr marL="0" lvl="0" indent="0" algn="l" rtl="0">
+              <a:spcBef>
+                <a:spcPts val="0"/>
+              </a:spcBef>
+              <a:spcAft>
+                <a:spcPts val="0"/>
+              </a:spcAft>
+              <a:buNone/>
+            </a:pPr>
             <a:r>
-              <a:rPr lang="en-US" sz="3200" dirty="0"/>
-              <a:t>Covid-19 Healthcare Costs vs Infection and Mortality</a:t>
+              <a:rPr lang="en" sz="3200" dirty="0"/>
+              <a:t>Covid-19 Infection and Mortality Rates by Uninsured</a:t>
             </a:r>
+            <a:endParaRPr sz="3200" dirty="0"/>
           </a:p>
         </p:txBody>
       </p:sp>
       <p:sp>
         <p:nvSpPr>
-          <p:cNvPr id="4" name="Slide Number Placeholder 3">
-            <a:extLst>
-              <a:ext uri="{FF2B5EF4-FFF2-40B4-BE49-F238E27FC236}">
-                <a16:creationId xmlns:a16="http://schemas.microsoft.com/office/drawing/2014/main" id="{2EB182E7-B6BC-4093-A283-0CFCD6D261D9}"/>
-              </a:ext>
-            </a:extLst>
-          </p:cNvPr>
-          <p:cNvSpPr>
+          <p:cNvPr id="197" name="Google Shape;197;p19"/>
+          <p:cNvSpPr txBox="1">
             <a:spLocks noGrp="1"/>
           </p:cNvSpPr>
           <p:nvPr>
             <p:ph type="sldNum" idx="12"/>
           </p:nvPr>
         </p:nvSpPr>
-        <p:spPr/>
-        <p:txBody>
-          <a:bodyPr/>
-          <a:lstStyle/>
-          <a:p>
-            <a:pPr marL="0" lvl="0" indent="0" algn="r" rtl="0">
-              <a:spcBef>
-                <a:spcPts val="0"/>
-              </a:spcBef>
-              <a:spcAft>
-                <a:spcPts val="0"/>
-              </a:spcAft>
-              <a:buNone/>
-            </a:pPr>
-            <a:fld id="{00000000-1234-1234-1234-123412341234}" type="slidenum">
-              <a:rPr lang="en" smtClean="0"/>
-              <a:t>10</a:t>
-            </a:fld>
-            <a:endParaRPr lang="en"/>
-          </a:p>
-        </p:txBody>
-      </p:sp>
-      <p:pic>
-        <p:nvPicPr>
-          <p:cNvPr id="11" name="Picture 10" descr="A screenshot of a cell phone&#10;&#10;Description automatically generated">
-            <a:extLst>
-              <a:ext uri="{FF2B5EF4-FFF2-40B4-BE49-F238E27FC236}">
-                <a16:creationId xmlns:a16="http://schemas.microsoft.com/office/drawing/2014/main" id="{8FEE5BCC-9870-4544-83B1-B072562F267B}"/>
-              </a:ext>
-            </a:extLst>
-          </p:cNvPr>
-          <p:cNvPicPr>
-            <a:picLocks noChangeAspect="1"/>
-          </p:cNvPicPr>
-          <p:nvPr/>
-        </p:nvPicPr>
-        <p:blipFill>
-          <a:blip r:embed="rId2"/>
-          <a:stretch>
-            <a:fillRect/>
-          </a:stretch>
-        </p:blipFill>
         <p:spPr>
           <a:xfrm>
-            <a:off x="219663" y="911143"/>
-            <a:ext cx="4161468" cy="2972477"/>
+            <a:off x="8404384" y="4673651"/>
+            <a:ext cx="548700" cy="393600"/>
           </a:xfrm>
           <a:prstGeom prst="rect">
             <a:avLst/>
           </a:prstGeom>
         </p:spPr>
-      </p:pic>
+        <p:txBody>
+          <a:bodyPr spcFirstLastPara="1" wrap="square" lIns="0" tIns="0" rIns="0" bIns="0" anchor="ctr" anchorCtr="0">
+            <a:noAutofit/>
+          </a:bodyPr>
+          <a:lstStyle/>
+          <a:p>
+            <a:pPr marL="0" lvl="0" indent="0" algn="r" rtl="0">
+              <a:spcBef>
+                <a:spcPts val="0"/>
+              </a:spcBef>
+              <a:spcAft>
+                <a:spcPts val="0"/>
+              </a:spcAft>
+              <a:buNone/>
+            </a:pPr>
+            <a:fld id="{00000000-1234-1234-1234-123412341234}" type="slidenum">
+              <a:rPr lang="en"/>
+              <a:t>11</a:t>
+            </a:fld>
+            <a:endParaRPr/>
+          </a:p>
+        </p:txBody>
+      </p:sp>
       <p:pic>
         <p:nvPicPr>
-          <p:cNvPr id="13" name="Picture 12" descr="A screenshot of a cell phone&#10;&#10;Description automatically generated">
+          <p:cNvPr id="12" name="Picture 11" descr="A screenshot of a computer&#10;&#10;Description automatically generated">
             <a:extLst>
               <a:ext uri="{FF2B5EF4-FFF2-40B4-BE49-F238E27FC236}">
-                <a16:creationId xmlns:a16="http://schemas.microsoft.com/office/drawing/2014/main" id="{53BC7A88-A606-45D5-8865-651B82CECBF8}"/>
+                <a16:creationId xmlns:a16="http://schemas.microsoft.com/office/drawing/2014/main" id="{D32217B0-A4D7-4BFC-8E83-02BC2647E347}"/>
               </a:ext>
             </a:extLst>
           </p:cNvPr>
@@ -5720,8 +5808,41 @@
         </p:blipFill>
         <p:spPr>
           <a:xfrm>
-            <a:off x="4648564" y="911143"/>
-            <a:ext cx="4161468" cy="2972477"/>
+            <a:off x="184250" y="864653"/>
+            <a:ext cx="4289514" cy="3063938"/>
+          </a:xfrm>
+          <a:prstGeom prst="rect">
+            <a:avLst/>
+          </a:prstGeom>
+          <a:ln>
+            <a:noFill/>
+          </a:ln>
+        </p:spPr>
+      </p:pic>
+      <p:pic>
+        <p:nvPicPr>
+          <p:cNvPr id="3" name="Picture 2" descr="A screenshot of a cell phone&#10;&#10;Description automatically generated">
+            <a:extLst>
+              <a:ext uri="{FF2B5EF4-FFF2-40B4-BE49-F238E27FC236}">
+                <a16:creationId xmlns:a16="http://schemas.microsoft.com/office/drawing/2014/main" id="{81533647-1D33-450E-AB59-84BED0EF24B0}"/>
+              </a:ext>
+            </a:extLst>
+          </p:cNvPr>
+          <p:cNvPicPr>
+            <a:picLocks noChangeAspect="1"/>
+          </p:cNvPicPr>
+          <p:nvPr/>
+        </p:nvPicPr>
+        <p:blipFill>
+          <a:blip r:embed="rId4"/>
+          <a:stretch>
+            <a:fillRect/>
+          </a:stretch>
+        </p:blipFill>
+        <p:spPr>
+          <a:xfrm>
+            <a:off x="4572000" y="864653"/>
+            <a:ext cx="4289514" cy="3063938"/>
           </a:xfrm>
           <a:prstGeom prst="rect">
             <a:avLst/>
@@ -5731,7 +5852,7 @@
     </p:spTree>
     <p:extLst>
       <p:ext uri="{BB962C8B-B14F-4D97-AF65-F5344CB8AC3E}">
-        <p14:creationId xmlns:p14="http://schemas.microsoft.com/office/powerpoint/2010/main" val="522767935"/>
+        <p14:creationId xmlns:p14="http://schemas.microsoft.com/office/powerpoint/2010/main" val="1175698088"/>
       </p:ext>
     </p:extLst>
   </p:cSld>
@@ -5741,7 +5862,7 @@
 </p:sld>
 </file>
 
-<file path=ppt/slides/slide11.xml><?xml version="1.0" encoding="utf-8"?>
+<file path=ppt/slides/slide12.xml><?xml version="1.0" encoding="utf-8"?>
 <p:sld xmlns:a="http://schemas.openxmlformats.org/drawingml/2006/main" xmlns:r="http://schemas.openxmlformats.org/officeDocument/2006/relationships" xmlns:p="http://schemas.openxmlformats.org/presentationml/2006/main">
   <p:cSld>
     <p:spTree>
@@ -5794,7 +5915,7 @@
             </a:pPr>
             <a:r>
               <a:rPr lang="en" sz="4800" dirty="0"/>
-              <a:t>Covid-19 Infection and Mortality Rates by Uninsured</a:t>
+              <a:t>Covid-19 and Mask Use</a:t>
             </a:r>
             <a:endParaRPr dirty="0"/>
           </a:p>
@@ -5841,184 +5962,7 @@
     </p:spTree>
     <p:extLst>
       <p:ext uri="{BB962C8B-B14F-4D97-AF65-F5344CB8AC3E}">
-        <p14:creationId xmlns:p14="http://schemas.microsoft.com/office/powerpoint/2010/main" val="1952650815"/>
-      </p:ext>
-    </p:extLst>
-  </p:cSld>
-  <p:clrMapOvr>
-    <a:masterClrMapping/>
-  </p:clrMapOvr>
-</p:sld>
-</file>
-
-<file path=ppt/slides/slide12.xml><?xml version="1.0" encoding="utf-8"?>
-<p:sld xmlns:a="http://schemas.openxmlformats.org/drawingml/2006/main" xmlns:r="http://schemas.openxmlformats.org/officeDocument/2006/relationships" xmlns:p="http://schemas.openxmlformats.org/presentationml/2006/main">
-  <p:cSld>
-    <p:spTree>
-      <p:nvGrpSpPr>
-        <p:cNvPr id="1" name="Shape 194"/>
-        <p:cNvGrpSpPr/>
-        <p:nvPr/>
-      </p:nvGrpSpPr>
-      <p:grpSpPr>
-        <a:xfrm>
-          <a:off x="0" y="0"/>
-          <a:ext cx="0" cy="0"/>
-          <a:chOff x="0" y="0"/>
-          <a:chExt cx="0" cy="0"/>
-        </a:xfrm>
-      </p:grpSpPr>
-      <p:sp>
-        <p:nvSpPr>
-          <p:cNvPr id="195" name="Google Shape;195;p19"/>
-          <p:cNvSpPr txBox="1">
-            <a:spLocks noGrp="1"/>
-          </p:cNvSpPr>
-          <p:nvPr>
-            <p:ph type="title"/>
-          </p:nvPr>
-        </p:nvSpPr>
-        <p:spPr>
-          <a:xfrm>
-            <a:off x="514799" y="130280"/>
-            <a:ext cx="8177379" cy="665100"/>
-          </a:xfrm>
-          <a:prstGeom prst="rect">
-            <a:avLst/>
-          </a:prstGeom>
-        </p:spPr>
-        <p:txBody>
-          <a:bodyPr spcFirstLastPara="1" wrap="square" lIns="0" tIns="0" rIns="0" bIns="0" anchor="ctr" anchorCtr="0">
-            <a:noAutofit/>
-          </a:bodyPr>
-          <a:lstStyle/>
-          <a:p>
-            <a:pPr marL="0" lvl="0" indent="0" algn="l" rtl="0">
-              <a:spcBef>
-                <a:spcPts val="0"/>
-              </a:spcBef>
-              <a:spcAft>
-                <a:spcPts val="0"/>
-              </a:spcAft>
-              <a:buNone/>
-            </a:pPr>
-            <a:r>
-              <a:rPr lang="en" sz="3200" dirty="0"/>
-              <a:t>Covid-19 Infection and Mortality Rates by Uninsured</a:t>
-            </a:r>
-            <a:endParaRPr sz="3200" dirty="0"/>
-          </a:p>
-        </p:txBody>
-      </p:sp>
-      <p:sp>
-        <p:nvSpPr>
-          <p:cNvPr id="197" name="Google Shape;197;p19"/>
-          <p:cNvSpPr txBox="1">
-            <a:spLocks noGrp="1"/>
-          </p:cNvSpPr>
-          <p:nvPr>
-            <p:ph type="sldNum" idx="12"/>
-          </p:nvPr>
-        </p:nvSpPr>
-        <p:spPr>
-          <a:xfrm>
-            <a:off x="8404384" y="4673651"/>
-            <a:ext cx="548700" cy="393600"/>
-          </a:xfrm>
-          <a:prstGeom prst="rect">
-            <a:avLst/>
-          </a:prstGeom>
-        </p:spPr>
-        <p:txBody>
-          <a:bodyPr spcFirstLastPara="1" wrap="square" lIns="0" tIns="0" rIns="0" bIns="0" anchor="ctr" anchorCtr="0">
-            <a:noAutofit/>
-          </a:bodyPr>
-          <a:lstStyle/>
-          <a:p>
-            <a:pPr marL="0" lvl="0" indent="0" algn="r" rtl="0">
-              <a:spcBef>
-                <a:spcPts val="0"/>
-              </a:spcBef>
-              <a:spcAft>
-                <a:spcPts val="0"/>
-              </a:spcAft>
-              <a:buNone/>
-            </a:pPr>
-            <a:fld id="{00000000-1234-1234-1234-123412341234}" type="slidenum">
-              <a:rPr lang="en"/>
-              <a:t>12</a:t>
-            </a:fld>
-            <a:endParaRPr/>
-          </a:p>
-        </p:txBody>
-      </p:sp>
-      <p:pic>
-        <p:nvPicPr>
-          <p:cNvPr id="12" name="Picture 11" descr="A screenshot of a computer&#10;&#10;Description automatically generated">
-            <a:extLst>
-              <a:ext uri="{FF2B5EF4-FFF2-40B4-BE49-F238E27FC236}">
-                <a16:creationId xmlns:a16="http://schemas.microsoft.com/office/drawing/2014/main" id="{D32217B0-A4D7-4BFC-8E83-02BC2647E347}"/>
-              </a:ext>
-            </a:extLst>
-          </p:cNvPr>
-          <p:cNvPicPr>
-            <a:picLocks noChangeAspect="1"/>
-          </p:cNvPicPr>
-          <p:nvPr/>
-        </p:nvPicPr>
-        <p:blipFill>
-          <a:blip r:embed="rId3"/>
-          <a:stretch>
-            <a:fillRect/>
-          </a:stretch>
-        </p:blipFill>
-        <p:spPr>
-          <a:xfrm>
-            <a:off x="184250" y="864653"/>
-            <a:ext cx="4289514" cy="3063938"/>
-          </a:xfrm>
-          <a:prstGeom prst="rect">
-            <a:avLst/>
-          </a:prstGeom>
-          <a:ln>
-            <a:noFill/>
-          </a:ln>
-        </p:spPr>
-      </p:pic>
-      <p:pic>
-        <p:nvPicPr>
-          <p:cNvPr id="18" name="Picture 17" descr="A screenshot of a cell phone&#10;&#10;Description automatically generated">
-            <a:extLst>
-              <a:ext uri="{FF2B5EF4-FFF2-40B4-BE49-F238E27FC236}">
-                <a16:creationId xmlns:a16="http://schemas.microsoft.com/office/drawing/2014/main" id="{D1278434-0B20-4D4A-B863-1D2BD3D021E6}"/>
-              </a:ext>
-            </a:extLst>
-          </p:cNvPr>
-          <p:cNvPicPr>
-            <a:picLocks noChangeAspect="1"/>
-          </p:cNvPicPr>
-          <p:nvPr/>
-        </p:nvPicPr>
-        <p:blipFill>
-          <a:blip r:embed="rId4"/>
-          <a:stretch>
-            <a:fillRect/>
-          </a:stretch>
-        </p:blipFill>
-        <p:spPr>
-          <a:xfrm>
-            <a:off x="4634343" y="864653"/>
-            <a:ext cx="4289514" cy="3063938"/>
-          </a:xfrm>
-          <a:prstGeom prst="rect">
-            <a:avLst/>
-          </a:prstGeom>
-        </p:spPr>
-      </p:pic>
-    </p:spTree>
-    <p:extLst>
-      <p:ext uri="{BB962C8B-B14F-4D97-AF65-F5344CB8AC3E}">
-        <p14:creationId xmlns:p14="http://schemas.microsoft.com/office/powerpoint/2010/main" val="1175698088"/>
+        <p14:creationId xmlns:p14="http://schemas.microsoft.com/office/powerpoint/2010/main" val="3466316281"/>
       </p:ext>
     </p:extLst>
   </p:cSld>
@@ -6410,7 +6354,7 @@
         </p:nvSpPr>
         <p:spPr>
           <a:xfrm>
-            <a:off x="514799" y="123353"/>
+            <a:off x="514799" y="130276"/>
             <a:ext cx="8177379" cy="665100"/>
           </a:xfrm>
           <a:prstGeom prst="rect">
@@ -6482,486 +6426,6 @@
           </a:p>
         </p:txBody>
       </p:sp>
-      <p:sp>
-        <p:nvSpPr>
-          <p:cNvPr id="7" name="Google Shape;196;p19">
-            <a:extLst>
-              <a:ext uri="{FF2B5EF4-FFF2-40B4-BE49-F238E27FC236}">
-                <a16:creationId xmlns:a16="http://schemas.microsoft.com/office/drawing/2014/main" id="{404A48EE-C251-4D6F-B060-504F337169F0}"/>
-              </a:ext>
-            </a:extLst>
-          </p:cNvPr>
-          <p:cNvSpPr txBox="1">
-            <a:spLocks noGrp="1"/>
-          </p:cNvSpPr>
-          <p:nvPr>
-            <p:ph type="body" idx="1"/>
-          </p:nvPr>
-        </p:nvSpPr>
-        <p:spPr>
-          <a:xfrm>
-            <a:off x="6022180" y="1530437"/>
-            <a:ext cx="2930903" cy="3034419"/>
-          </a:xfrm>
-          <a:prstGeom prst="rect">
-            <a:avLst/>
-          </a:prstGeom>
-        </p:spPr>
-        <p:txBody>
-          <a:bodyPr spcFirstLastPara="1" wrap="square" lIns="0" tIns="0" rIns="0" bIns="0" anchor="t" anchorCtr="0">
-            <a:noAutofit/>
-          </a:bodyPr>
-          <a:lstStyle/>
-          <a:p>
-            <a:pPr>
-              <a:spcBef>
-                <a:spcPts val="0"/>
-              </a:spcBef>
-            </a:pPr>
-            <a:r>
-              <a:rPr kumimoji="0" lang="en-US" altLang="en-US" sz="800" b="1" i="0" u="none" strike="noStrike" cap="none" normalizeH="0" baseline="0" dirty="0">
-                <a:ln>
-                  <a:noFill/>
-                </a:ln>
-                <a:effectLst/>
-                <a:latin typeface="Arial" panose="020B0604020202020204" pitchFamily="34" charset="0"/>
-                <a:cs typeface="Arial" panose="020B0604020202020204" pitchFamily="34" charset="0"/>
-              </a:rPr>
-              <a:t>ALWAYS</a:t>
-            </a:r>
-          </a:p>
-          <a:p>
-            <a:pPr lvl="1"/>
-            <a:r>
-              <a:rPr kumimoji="0" lang="en-US" altLang="en-US" sz="800" b="1" i="0" u="none" strike="noStrike" cap="none" normalizeH="0" baseline="0" dirty="0">
-                <a:ln>
-                  <a:noFill/>
-                </a:ln>
-                <a:effectLst/>
-                <a:latin typeface="Arial" panose="020B0604020202020204" pitchFamily="34" charset="0"/>
-                <a:cs typeface="Arial" panose="020B0604020202020204" pitchFamily="34" charset="0"/>
-              </a:rPr>
-              <a:t>The correlation coefficient (r) is 0.5</a:t>
-            </a:r>
-          </a:p>
-          <a:p>
-            <a:pPr lvl="1"/>
-            <a:r>
-              <a:rPr kumimoji="0" lang="en-US" altLang="en-US" sz="800" b="1" i="0" u="none" strike="noStrike" cap="none" normalizeH="0" baseline="0" dirty="0">
-                <a:ln>
-                  <a:noFill/>
-                </a:ln>
-                <a:effectLst/>
-                <a:latin typeface="Arial" panose="020B0604020202020204" pitchFamily="34" charset="0"/>
-                <a:cs typeface="Arial" panose="020B0604020202020204" pitchFamily="34" charset="0"/>
-              </a:rPr>
-              <a:t>The p-value is 0.000166</a:t>
-            </a:r>
-          </a:p>
-          <a:p>
-            <a:pPr lvl="1"/>
-            <a:r>
-              <a:rPr kumimoji="0" lang="en-US" altLang="en-US" sz="800" b="1" i="0" u="none" strike="noStrike" cap="none" normalizeH="0" baseline="0" dirty="0">
-                <a:ln>
-                  <a:noFill/>
-                </a:ln>
-                <a:effectLst/>
-                <a:latin typeface="Arial" panose="020B0604020202020204" pitchFamily="34" charset="0"/>
-                <a:cs typeface="Arial" panose="020B0604020202020204" pitchFamily="34" charset="0"/>
-              </a:rPr>
-              <a:t>The r-squared is 0.25</a:t>
-            </a:r>
-          </a:p>
-          <a:p>
-            <a:pPr>
-              <a:spcBef>
-                <a:spcPts val="0"/>
-              </a:spcBef>
-            </a:pPr>
-            <a:r>
-              <a:rPr kumimoji="0" lang="en-US" altLang="en-US" sz="800" b="1" i="0" u="none" strike="noStrike" cap="none" normalizeH="0" baseline="0" dirty="0">
-                <a:ln>
-                  <a:noFill/>
-                </a:ln>
-                <a:effectLst/>
-                <a:latin typeface="Arial" panose="020B0604020202020204" pitchFamily="34" charset="0"/>
-                <a:cs typeface="Arial" panose="020B0604020202020204" pitchFamily="34" charset="0"/>
-              </a:rPr>
-              <a:t>FREQUENTLY</a:t>
-            </a:r>
-          </a:p>
-          <a:p>
-            <a:pPr lvl="1"/>
-            <a:r>
-              <a:rPr kumimoji="0" lang="en-US" altLang="en-US" sz="800" b="1" i="0" u="none" strike="noStrike" cap="none" normalizeH="0" baseline="0" dirty="0">
-                <a:ln>
-                  <a:noFill/>
-                </a:ln>
-                <a:effectLst/>
-                <a:latin typeface="Arial" panose="020B0604020202020204" pitchFamily="34" charset="0"/>
-                <a:cs typeface="Arial" panose="020B0604020202020204" pitchFamily="34" charset="0"/>
-              </a:rPr>
-              <a:t>The correlation coefficient (r) is -0.33</a:t>
-            </a:r>
-          </a:p>
-          <a:p>
-            <a:pPr lvl="1"/>
-            <a:r>
-              <a:rPr kumimoji="0" lang="en-US" altLang="en-US" sz="800" b="1" i="0" u="none" strike="noStrike" cap="none" normalizeH="0" baseline="0" dirty="0">
-                <a:ln>
-                  <a:noFill/>
-                </a:ln>
-                <a:effectLst/>
-                <a:latin typeface="Arial" panose="020B0604020202020204" pitchFamily="34" charset="0"/>
-                <a:cs typeface="Arial" panose="020B0604020202020204" pitchFamily="34" charset="0"/>
-              </a:rPr>
-              <a:t>The p-value is 0.016612</a:t>
-            </a:r>
-          </a:p>
-          <a:p>
-            <a:pPr lvl="1"/>
-            <a:r>
-              <a:rPr kumimoji="0" lang="en-US" altLang="en-US" sz="800" b="1" i="0" u="none" strike="noStrike" cap="none" normalizeH="0" baseline="0" dirty="0">
-                <a:ln>
-                  <a:noFill/>
-                </a:ln>
-                <a:effectLst/>
-                <a:latin typeface="Arial" panose="020B0604020202020204" pitchFamily="34" charset="0"/>
-                <a:cs typeface="Arial" panose="020B0604020202020204" pitchFamily="34" charset="0"/>
-              </a:rPr>
-              <a:t>The r-squared is 0.11</a:t>
-            </a:r>
-          </a:p>
-          <a:p>
-            <a:pPr>
-              <a:spcBef>
-                <a:spcPts val="0"/>
-              </a:spcBef>
-            </a:pPr>
-            <a:r>
-              <a:rPr kumimoji="0" lang="en-US" altLang="en-US" sz="800" b="1" i="0" u="none" strike="noStrike" cap="none" normalizeH="0" baseline="0" dirty="0">
-                <a:ln>
-                  <a:noFill/>
-                </a:ln>
-                <a:effectLst/>
-                <a:latin typeface="Arial" panose="020B0604020202020204" pitchFamily="34" charset="0"/>
-                <a:cs typeface="Arial" panose="020B0604020202020204" pitchFamily="34" charset="0"/>
-              </a:rPr>
-              <a:t>SOMETIMES</a:t>
-            </a:r>
-          </a:p>
-          <a:p>
-            <a:pPr lvl="1"/>
-            <a:r>
-              <a:rPr kumimoji="0" lang="en-US" altLang="en-US" sz="800" b="1" i="0" u="none" strike="noStrike" cap="none" normalizeH="0" baseline="0" dirty="0">
-                <a:ln>
-                  <a:noFill/>
-                </a:ln>
-                <a:effectLst/>
-                <a:latin typeface="Arial" panose="020B0604020202020204" pitchFamily="34" charset="0"/>
-                <a:cs typeface="Arial" panose="020B0604020202020204" pitchFamily="34" charset="0"/>
-              </a:rPr>
-              <a:t>The correlation coefficient (r) is -0.62</a:t>
-            </a:r>
-          </a:p>
-          <a:p>
-            <a:pPr lvl="1"/>
-            <a:r>
-              <a:rPr kumimoji="0" lang="en-US" altLang="en-US" sz="800" b="1" i="0" u="none" strike="noStrike" cap="none" normalizeH="0" baseline="0" dirty="0">
-                <a:ln>
-                  <a:noFill/>
-                </a:ln>
-                <a:effectLst/>
-                <a:latin typeface="Arial" panose="020B0604020202020204" pitchFamily="34" charset="0"/>
-                <a:cs typeface="Arial" panose="020B0604020202020204" pitchFamily="34" charset="0"/>
-              </a:rPr>
-              <a:t>The p-value is 1e-06</a:t>
-            </a:r>
-          </a:p>
-          <a:p>
-            <a:pPr lvl="1"/>
-            <a:r>
-              <a:rPr kumimoji="0" lang="en-US" altLang="en-US" sz="800" b="1" i="0" u="none" strike="noStrike" cap="none" normalizeH="0" baseline="0" dirty="0">
-                <a:ln>
-                  <a:noFill/>
-                </a:ln>
-                <a:effectLst/>
-                <a:latin typeface="Arial" panose="020B0604020202020204" pitchFamily="34" charset="0"/>
-                <a:cs typeface="Arial" panose="020B0604020202020204" pitchFamily="34" charset="0"/>
-              </a:rPr>
-              <a:t>The r-squared is 0.39</a:t>
-            </a:r>
-          </a:p>
-          <a:p>
-            <a:pPr>
-              <a:spcBef>
-                <a:spcPts val="0"/>
-              </a:spcBef>
-            </a:pPr>
-            <a:r>
-              <a:rPr kumimoji="0" lang="en-US" altLang="en-US" sz="800" b="1" i="0" u="none" strike="noStrike" cap="none" normalizeH="0" baseline="0" dirty="0">
-                <a:ln>
-                  <a:noFill/>
-                </a:ln>
-                <a:effectLst/>
-                <a:latin typeface="Arial" panose="020B0604020202020204" pitchFamily="34" charset="0"/>
-                <a:cs typeface="Arial" panose="020B0604020202020204" pitchFamily="34" charset="0"/>
-              </a:rPr>
-              <a:t>RARELY</a:t>
-            </a:r>
-          </a:p>
-          <a:p>
-            <a:pPr lvl="1"/>
-            <a:r>
-              <a:rPr kumimoji="0" lang="en-US" altLang="en-US" sz="800" b="1" i="0" u="none" strike="noStrike" cap="none" normalizeH="0" baseline="0" dirty="0">
-                <a:ln>
-                  <a:noFill/>
-                </a:ln>
-                <a:effectLst/>
-                <a:latin typeface="Arial" panose="020B0604020202020204" pitchFamily="34" charset="0"/>
-                <a:cs typeface="Arial" panose="020B0604020202020204" pitchFamily="34" charset="0"/>
-              </a:rPr>
-              <a:t>The correlation coefficient (r) is -0.45</a:t>
-            </a:r>
-          </a:p>
-          <a:p>
-            <a:pPr lvl="1"/>
-            <a:r>
-              <a:rPr kumimoji="0" lang="en-US" altLang="en-US" sz="800" b="1" i="0" u="none" strike="noStrike" cap="none" normalizeH="0" baseline="0" dirty="0">
-                <a:ln>
-                  <a:noFill/>
-                </a:ln>
-                <a:effectLst/>
-                <a:latin typeface="Arial" panose="020B0604020202020204" pitchFamily="34" charset="0"/>
-                <a:cs typeface="Arial" panose="020B0604020202020204" pitchFamily="34" charset="0"/>
-              </a:rPr>
-              <a:t>The p-value is 0.00099</a:t>
-            </a:r>
-          </a:p>
-          <a:p>
-            <a:pPr lvl="1"/>
-            <a:r>
-              <a:rPr kumimoji="0" lang="en-US" altLang="en-US" sz="800" b="1" i="0" u="none" strike="noStrike" cap="none" normalizeH="0" baseline="0" dirty="0">
-                <a:ln>
-                  <a:noFill/>
-                </a:ln>
-                <a:effectLst/>
-                <a:latin typeface="Arial" panose="020B0604020202020204" pitchFamily="34" charset="0"/>
-                <a:cs typeface="Arial" panose="020B0604020202020204" pitchFamily="34" charset="0"/>
-              </a:rPr>
-              <a:t>The r-squared is 0.2</a:t>
-            </a:r>
-          </a:p>
-          <a:p>
-            <a:pPr>
-              <a:spcBef>
-                <a:spcPts val="0"/>
-              </a:spcBef>
-            </a:pPr>
-            <a:r>
-              <a:rPr kumimoji="0" lang="en-US" altLang="en-US" sz="800" b="1" i="0" u="none" strike="noStrike" cap="none" normalizeH="0" baseline="0" dirty="0">
-                <a:ln>
-                  <a:noFill/>
-                </a:ln>
-                <a:effectLst/>
-                <a:latin typeface="Arial" panose="020B0604020202020204" pitchFamily="34" charset="0"/>
-                <a:cs typeface="Arial" panose="020B0604020202020204" pitchFamily="34" charset="0"/>
-              </a:rPr>
-              <a:t>NEVER</a:t>
-            </a:r>
-          </a:p>
-          <a:p>
-            <a:pPr lvl="1"/>
-            <a:r>
-              <a:rPr kumimoji="0" lang="en-US" altLang="en-US" sz="800" b="1" i="0" u="none" strike="noStrike" cap="none" normalizeH="0" baseline="0" dirty="0">
-                <a:ln>
-                  <a:noFill/>
-                </a:ln>
-                <a:effectLst/>
-                <a:latin typeface="Arial" panose="020B0604020202020204" pitchFamily="34" charset="0"/>
-                <a:cs typeface="Arial" panose="020B0604020202020204" pitchFamily="34" charset="0"/>
-              </a:rPr>
-              <a:t>The correlation coefficient (r) is -0.45</a:t>
-            </a:r>
-          </a:p>
-          <a:p>
-            <a:pPr lvl="1"/>
-            <a:r>
-              <a:rPr kumimoji="0" lang="en-US" altLang="en-US" sz="800" b="1" i="0" u="none" strike="noStrike" cap="none" normalizeH="0" baseline="0" dirty="0">
-                <a:ln>
-                  <a:noFill/>
-                </a:ln>
-                <a:effectLst/>
-                <a:latin typeface="Arial" panose="020B0604020202020204" pitchFamily="34" charset="0"/>
-                <a:cs typeface="Arial" panose="020B0604020202020204" pitchFamily="34" charset="0"/>
-              </a:rPr>
-              <a:t>The p-value is 0.000934</a:t>
-            </a:r>
-          </a:p>
-          <a:p>
-            <a:pPr lvl="1"/>
-            <a:r>
-              <a:rPr kumimoji="0" lang="en-US" altLang="en-US" sz="800" b="1" i="0" u="none" strike="noStrike" cap="none" normalizeH="0" baseline="0" dirty="0">
-                <a:ln>
-                  <a:noFill/>
-                </a:ln>
-                <a:effectLst/>
-                <a:latin typeface="Arial" panose="020B0604020202020204" pitchFamily="34" charset="0"/>
-                <a:cs typeface="Arial" panose="020B0604020202020204" pitchFamily="34" charset="0"/>
-              </a:rPr>
-              <a:t>The r-squared is 0.2</a:t>
-            </a:r>
-            <a:endParaRPr lang="en-US" sz="800" b="1" dirty="0">
-              <a:latin typeface="Arial" panose="020B0604020202020204" pitchFamily="34" charset="0"/>
-              <a:cs typeface="Arial" panose="020B0604020202020204" pitchFamily="34" charset="0"/>
-            </a:endParaRPr>
-          </a:p>
-        </p:txBody>
-      </p:sp>
-      <p:pic>
-        <p:nvPicPr>
-          <p:cNvPr id="10" name="Picture 9" descr="A screenshot of a video game&#10;&#10;Description automatically generated">
-            <a:extLst>
-              <a:ext uri="{FF2B5EF4-FFF2-40B4-BE49-F238E27FC236}">
-                <a16:creationId xmlns:a16="http://schemas.microsoft.com/office/drawing/2014/main" id="{AC49FDAE-3617-4CAC-8614-4464C3757C02}"/>
-              </a:ext>
-            </a:extLst>
-          </p:cNvPr>
-          <p:cNvPicPr>
-            <a:picLocks noChangeAspect="1"/>
-          </p:cNvPicPr>
-          <p:nvPr/>
-        </p:nvPicPr>
-        <p:blipFill>
-          <a:blip r:embed="rId3"/>
-          <a:stretch>
-            <a:fillRect/>
-          </a:stretch>
-        </p:blipFill>
-        <p:spPr>
-          <a:xfrm>
-            <a:off x="355995" y="1219543"/>
-            <a:ext cx="5666185" cy="2266474"/>
-          </a:xfrm>
-          <a:prstGeom prst="rect">
-            <a:avLst/>
-          </a:prstGeom>
-        </p:spPr>
-      </p:pic>
-    </p:spTree>
-    <p:extLst>
-      <p:ext uri="{BB962C8B-B14F-4D97-AF65-F5344CB8AC3E}">
-        <p14:creationId xmlns:p14="http://schemas.microsoft.com/office/powerpoint/2010/main" val="1853936967"/>
-      </p:ext>
-    </p:extLst>
-  </p:cSld>
-  <p:clrMapOvr>
-    <a:masterClrMapping/>
-  </p:clrMapOvr>
-</p:sld>
-</file>
-
-<file path=ppt/slides/slide16.xml><?xml version="1.0" encoding="utf-8"?>
-<p:sld xmlns:a="http://schemas.openxmlformats.org/drawingml/2006/main" xmlns:r="http://schemas.openxmlformats.org/officeDocument/2006/relationships" xmlns:p="http://schemas.openxmlformats.org/presentationml/2006/main">
-  <p:cSld>
-    <p:spTree>
-      <p:nvGrpSpPr>
-        <p:cNvPr id="1" name="Shape 194"/>
-        <p:cNvGrpSpPr/>
-        <p:nvPr/>
-      </p:nvGrpSpPr>
-      <p:grpSpPr>
-        <a:xfrm>
-          <a:off x="0" y="0"/>
-          <a:ext cx="0" cy="0"/>
-          <a:chOff x="0" y="0"/>
-          <a:chExt cx="0" cy="0"/>
-        </a:xfrm>
-      </p:grpSpPr>
-      <p:sp>
-        <p:nvSpPr>
-          <p:cNvPr id="195" name="Google Shape;195;p19"/>
-          <p:cNvSpPr txBox="1">
-            <a:spLocks noGrp="1"/>
-          </p:cNvSpPr>
-          <p:nvPr>
-            <p:ph type="title"/>
-          </p:nvPr>
-        </p:nvSpPr>
-        <p:spPr>
-          <a:xfrm>
-            <a:off x="514799" y="130276"/>
-            <a:ext cx="8177379" cy="665100"/>
-          </a:xfrm>
-          <a:prstGeom prst="rect">
-            <a:avLst/>
-          </a:prstGeom>
-        </p:spPr>
-        <p:txBody>
-          <a:bodyPr spcFirstLastPara="1" wrap="square" lIns="0" tIns="0" rIns="0" bIns="0" anchor="ctr" anchorCtr="0">
-            <a:noAutofit/>
-          </a:bodyPr>
-          <a:lstStyle/>
-          <a:p>
-            <a:pPr marL="0" lvl="0" indent="0" algn="l" rtl="0">
-              <a:spcBef>
-                <a:spcPts val="0"/>
-              </a:spcBef>
-              <a:spcAft>
-                <a:spcPts val="0"/>
-              </a:spcAft>
-              <a:buNone/>
-            </a:pPr>
-            <a:r>
-              <a:rPr lang="en" sz="3200" dirty="0"/>
-              <a:t>Covid-19 Mask Usage vs Median Household Income</a:t>
-            </a:r>
-            <a:endParaRPr sz="3200" dirty="0"/>
-          </a:p>
-        </p:txBody>
-      </p:sp>
-      <p:sp>
-        <p:nvSpPr>
-          <p:cNvPr id="197" name="Google Shape;197;p19"/>
-          <p:cNvSpPr txBox="1">
-            <a:spLocks noGrp="1"/>
-          </p:cNvSpPr>
-          <p:nvPr>
-            <p:ph type="sldNum" idx="12"/>
-          </p:nvPr>
-        </p:nvSpPr>
-        <p:spPr>
-          <a:xfrm>
-            <a:off x="8404384" y="4673651"/>
-            <a:ext cx="548700" cy="393600"/>
-          </a:xfrm>
-          <a:prstGeom prst="rect">
-            <a:avLst/>
-          </a:prstGeom>
-        </p:spPr>
-        <p:txBody>
-          <a:bodyPr spcFirstLastPara="1" wrap="square" lIns="0" tIns="0" rIns="0" bIns="0" anchor="ctr" anchorCtr="0">
-            <a:noAutofit/>
-          </a:bodyPr>
-          <a:lstStyle/>
-          <a:p>
-            <a:pPr marL="0" lvl="0" indent="0" algn="r" rtl="0">
-              <a:spcBef>
-                <a:spcPts val="0"/>
-              </a:spcBef>
-              <a:spcAft>
-                <a:spcPts val="0"/>
-              </a:spcAft>
-              <a:buNone/>
-            </a:pPr>
-            <a:fld id="{00000000-1234-1234-1234-123412341234}" type="slidenum">
-              <a:rPr lang="en"/>
-              <a:t>16</a:t>
-            </a:fld>
-            <a:endParaRPr/>
-          </a:p>
-        </p:txBody>
-      </p:sp>
       <p:sp useBgFill="1">
         <p:nvSpPr>
           <p:cNvPr id="7" name="Google Shape;196;p19">
@@ -6980,8 +6444,8 @@
         </p:nvSpPr>
         <p:spPr>
           <a:xfrm>
-            <a:off x="159326" y="3730252"/>
-            <a:ext cx="3138055" cy="1336999"/>
+            <a:off x="159327" y="3730252"/>
+            <a:ext cx="2980562" cy="1336999"/>
           </a:xfrm>
           <a:prstGeom prst="rect">
             <a:avLst/>
@@ -7135,8 +6599,8 @@
         </p:nvSpPr>
         <p:spPr>
           <a:xfrm>
-            <a:off x="3191508" y="3730252"/>
-            <a:ext cx="3334870" cy="1336999"/>
+            <a:off x="3139889" y="3730252"/>
+            <a:ext cx="3428999" cy="1336999"/>
           </a:xfrm>
           <a:prstGeom prst="rect">
             <a:avLst/>
@@ -7509,8 +6973,8 @@
         </p:nvSpPr>
         <p:spPr>
           <a:xfrm>
-            <a:off x="6075218" y="3672629"/>
-            <a:ext cx="2985655" cy="920153"/>
+            <a:off x="6080311" y="3672629"/>
+            <a:ext cx="2980562" cy="920153"/>
           </a:xfrm>
           <a:prstGeom prst="rect">
             <a:avLst/>
@@ -7857,10 +7321,356 @@
           </a:prstGeom>
         </p:spPr>
       </p:pic>
+      <p:sp>
+        <p:nvSpPr>
+          <p:cNvPr id="3" name="TextBox 2">
+            <a:extLst>
+              <a:ext uri="{FF2B5EF4-FFF2-40B4-BE49-F238E27FC236}">
+                <a16:creationId xmlns:a16="http://schemas.microsoft.com/office/drawing/2014/main" id="{995D013F-4A7E-4A8E-A135-DEB4C8B0ED23}"/>
+              </a:ext>
+            </a:extLst>
+          </p:cNvPr>
+          <p:cNvSpPr txBox="1"/>
+          <p:nvPr/>
+        </p:nvSpPr>
+        <p:spPr>
+          <a:xfrm>
+            <a:off x="2276285" y="1306587"/>
+            <a:ext cx="863604" cy="276999"/>
+          </a:xfrm>
+          <a:prstGeom prst="rect">
+            <a:avLst/>
+          </a:prstGeom>
+          <a:noFill/>
+        </p:spPr>
+        <p:txBody>
+          <a:bodyPr wrap="square" rtlCol="0">
+            <a:spAutoFit/>
+          </a:bodyPr>
+          <a:lstStyle/>
+          <a:p>
+            <a:r>
+              <a:rPr lang="en-US" sz="1200" b="1" dirty="0">
+                <a:solidFill>
+                  <a:srgbClr val="FFC000"/>
+                </a:solidFill>
+              </a:rPr>
+              <a:t>ALWAYS</a:t>
+            </a:r>
+          </a:p>
+        </p:txBody>
+      </p:sp>
+      <p:sp>
+        <p:nvSpPr>
+          <p:cNvPr id="5" name="TextBox 4">
+            <a:extLst>
+              <a:ext uri="{FF2B5EF4-FFF2-40B4-BE49-F238E27FC236}">
+                <a16:creationId xmlns:a16="http://schemas.microsoft.com/office/drawing/2014/main" id="{67FC919B-151D-4AEC-8B17-1A741EF82D66}"/>
+              </a:ext>
+            </a:extLst>
+          </p:cNvPr>
+          <p:cNvSpPr txBox="1"/>
+          <p:nvPr/>
+        </p:nvSpPr>
+        <p:spPr>
+          <a:xfrm>
+            <a:off x="4315455" y="1321976"/>
+            <a:ext cx="1219201" cy="276999"/>
+          </a:xfrm>
+          <a:prstGeom prst="rect">
+            <a:avLst/>
+          </a:prstGeom>
+          <a:noFill/>
+        </p:spPr>
+        <p:txBody>
+          <a:bodyPr wrap="square" rtlCol="0">
+            <a:spAutoFit/>
+          </a:bodyPr>
+          <a:lstStyle/>
+          <a:p>
+            <a:r>
+              <a:rPr lang="en-US" sz="1200" b="1" dirty="0">
+                <a:solidFill>
+                  <a:srgbClr val="FFC000"/>
+                </a:solidFill>
+              </a:rPr>
+              <a:t>FREQUENTLY</a:t>
+            </a:r>
+          </a:p>
+        </p:txBody>
+      </p:sp>
+      <p:sp>
+        <p:nvSpPr>
+          <p:cNvPr id="8" name="TextBox 7">
+            <a:extLst>
+              <a:ext uri="{FF2B5EF4-FFF2-40B4-BE49-F238E27FC236}">
+                <a16:creationId xmlns:a16="http://schemas.microsoft.com/office/drawing/2014/main" id="{E6198C91-A6F6-4369-817D-837CDFC70B6D}"/>
+              </a:ext>
+            </a:extLst>
+          </p:cNvPr>
+          <p:cNvSpPr txBox="1"/>
+          <p:nvPr/>
+        </p:nvSpPr>
+        <p:spPr>
+          <a:xfrm>
+            <a:off x="6710222" y="1306586"/>
+            <a:ext cx="1117596" cy="276999"/>
+          </a:xfrm>
+          <a:prstGeom prst="rect">
+            <a:avLst/>
+          </a:prstGeom>
+          <a:noFill/>
+        </p:spPr>
+        <p:txBody>
+          <a:bodyPr wrap="square" rtlCol="0">
+            <a:spAutoFit/>
+          </a:bodyPr>
+          <a:lstStyle/>
+          <a:p>
+            <a:r>
+              <a:rPr lang="en-US" sz="1200" b="1" dirty="0">
+                <a:solidFill>
+                  <a:srgbClr val="FFC000"/>
+                </a:solidFill>
+              </a:rPr>
+              <a:t>SOMETIMES</a:t>
+            </a:r>
+          </a:p>
+        </p:txBody>
+      </p:sp>
+      <p:sp>
+        <p:nvSpPr>
+          <p:cNvPr id="10" name="TextBox 9">
+            <a:extLst>
+              <a:ext uri="{FF2B5EF4-FFF2-40B4-BE49-F238E27FC236}">
+                <a16:creationId xmlns:a16="http://schemas.microsoft.com/office/drawing/2014/main" id="{EC894649-16F7-4C51-B03E-B35F05BED1EB}"/>
+              </a:ext>
+            </a:extLst>
+          </p:cNvPr>
+          <p:cNvSpPr txBox="1"/>
+          <p:nvPr/>
+        </p:nvSpPr>
+        <p:spPr>
+          <a:xfrm>
+            <a:off x="2276285" y="2571750"/>
+            <a:ext cx="863604" cy="276999"/>
+          </a:xfrm>
+          <a:prstGeom prst="rect">
+            <a:avLst/>
+          </a:prstGeom>
+          <a:noFill/>
+        </p:spPr>
+        <p:txBody>
+          <a:bodyPr wrap="square" rtlCol="0">
+            <a:spAutoFit/>
+          </a:bodyPr>
+          <a:lstStyle/>
+          <a:p>
+            <a:r>
+              <a:rPr lang="en-US" sz="1200" b="1" dirty="0">
+                <a:solidFill>
+                  <a:srgbClr val="FFC000"/>
+                </a:solidFill>
+              </a:rPr>
+              <a:t>RARELY</a:t>
+            </a:r>
+          </a:p>
+        </p:txBody>
+      </p:sp>
+      <p:sp>
+        <p:nvSpPr>
+          <p:cNvPr id="12" name="TextBox 11">
+            <a:extLst>
+              <a:ext uri="{FF2B5EF4-FFF2-40B4-BE49-F238E27FC236}">
+                <a16:creationId xmlns:a16="http://schemas.microsoft.com/office/drawing/2014/main" id="{96B5ACBD-7ABF-49AE-9842-F7B804016DB0}"/>
+              </a:ext>
+            </a:extLst>
+          </p:cNvPr>
+          <p:cNvSpPr txBox="1"/>
+          <p:nvPr/>
+        </p:nvSpPr>
+        <p:spPr>
+          <a:xfrm>
+            <a:off x="4335656" y="2545726"/>
+            <a:ext cx="863604" cy="276999"/>
+          </a:xfrm>
+          <a:prstGeom prst="rect">
+            <a:avLst/>
+          </a:prstGeom>
+          <a:noFill/>
+        </p:spPr>
+        <p:txBody>
+          <a:bodyPr wrap="square" rtlCol="0">
+            <a:spAutoFit/>
+          </a:bodyPr>
+          <a:lstStyle/>
+          <a:p>
+            <a:r>
+              <a:rPr lang="en-US" sz="1200" b="1" dirty="0">
+                <a:solidFill>
+                  <a:srgbClr val="FFC000"/>
+                </a:solidFill>
+              </a:rPr>
+              <a:t>NEVER</a:t>
+            </a:r>
+          </a:p>
+        </p:txBody>
+      </p:sp>
     </p:spTree>
     <p:extLst>
       <p:ext uri="{BB962C8B-B14F-4D97-AF65-F5344CB8AC3E}">
         <p14:creationId xmlns:p14="http://schemas.microsoft.com/office/powerpoint/2010/main" val="2343060881"/>
+      </p:ext>
+    </p:extLst>
+  </p:cSld>
+  <p:clrMapOvr>
+    <a:masterClrMapping/>
+  </p:clrMapOvr>
+</p:sld>
+</file>
+
+<file path=ppt/slides/slide16.xml><?xml version="1.0" encoding="utf-8"?>
+<p:sld xmlns:a="http://schemas.openxmlformats.org/drawingml/2006/main" xmlns:r="http://schemas.openxmlformats.org/officeDocument/2006/relationships" xmlns:p="http://schemas.openxmlformats.org/presentationml/2006/main">
+  <p:cSld>
+    <p:spTree>
+      <p:nvGrpSpPr>
+        <p:cNvPr id="1" name=""/>
+        <p:cNvGrpSpPr/>
+        <p:nvPr/>
+      </p:nvGrpSpPr>
+      <p:grpSpPr>
+        <a:xfrm>
+          <a:off x="0" y="0"/>
+          <a:ext cx="0" cy="0"/>
+          <a:chOff x="0" y="0"/>
+          <a:chExt cx="0" cy="0"/>
+        </a:xfrm>
+      </p:grpSpPr>
+      <p:sp>
+        <p:nvSpPr>
+          <p:cNvPr id="2" name="Title 1">
+            <a:extLst>
+              <a:ext uri="{FF2B5EF4-FFF2-40B4-BE49-F238E27FC236}">
+                <a16:creationId xmlns:a16="http://schemas.microsoft.com/office/drawing/2014/main" id="{2E7EE3BF-5DD9-4874-841D-32E72B2EF690}"/>
+              </a:ext>
+            </a:extLst>
+          </p:cNvPr>
+          <p:cNvSpPr>
+            <a:spLocks noGrp="1"/>
+          </p:cNvSpPr>
+          <p:nvPr>
+            <p:ph type="title"/>
+          </p:nvPr>
+        </p:nvSpPr>
+        <p:spPr/>
+        <p:txBody>
+          <a:bodyPr/>
+          <a:lstStyle/>
+          <a:p>
+            <a:r>
+              <a:rPr lang="en-US" dirty="0"/>
+              <a:t>Conclusion</a:t>
+            </a:r>
+          </a:p>
+        </p:txBody>
+      </p:sp>
+      <p:sp>
+        <p:nvSpPr>
+          <p:cNvPr id="3" name="Text Placeholder 2">
+            <a:extLst>
+              <a:ext uri="{FF2B5EF4-FFF2-40B4-BE49-F238E27FC236}">
+                <a16:creationId xmlns:a16="http://schemas.microsoft.com/office/drawing/2014/main" id="{DB7B2341-9650-4F34-BD3D-2AD897A28B81}"/>
+              </a:ext>
+            </a:extLst>
+          </p:cNvPr>
+          <p:cNvSpPr>
+            <a:spLocks noGrp="1"/>
+          </p:cNvSpPr>
+          <p:nvPr>
+            <p:ph type="body" idx="1"/>
+          </p:nvPr>
+        </p:nvSpPr>
+        <p:spPr>
+          <a:xfrm>
+            <a:off x="514800" y="903900"/>
+            <a:ext cx="6373800" cy="3557264"/>
+          </a:xfrm>
+        </p:spPr>
+        <p:txBody>
+          <a:bodyPr/>
+          <a:lstStyle/>
+          <a:p>
+            <a:r>
+              <a:rPr lang="en-US" sz="1600" dirty="0"/>
+              <a:t>Although we found that Covid-19 infections and Covid-19 deaths to be strongly related and predictive, economic factors such as healthcare costs and uninsured rates were linked to Covid-19 infections, but not to mortality.</a:t>
+            </a:r>
+          </a:p>
+          <a:p>
+            <a:r>
+              <a:rPr lang="en-US" sz="1600" dirty="0"/>
+              <a:t>Economic factors such as median income to be predictive of always mask use wearers.</a:t>
+            </a:r>
+          </a:p>
+          <a:p>
+            <a:pPr lvl="1"/>
+            <a:r>
+              <a:rPr lang="en-US" sz="1600" dirty="0"/>
+              <a:t>High median income and high mask use are clustered in the northeast states which interestingly is the region in the country with the lowest Covid-19 infections since July 2020.</a:t>
+            </a:r>
+          </a:p>
+          <a:p>
+            <a:endParaRPr lang="en-US" dirty="0"/>
+          </a:p>
+          <a:p>
+            <a:endParaRPr lang="en-US" dirty="0"/>
+          </a:p>
+          <a:p>
+            <a:endParaRPr lang="en-US" dirty="0"/>
+          </a:p>
+        </p:txBody>
+      </p:sp>
+      <p:sp>
+        <p:nvSpPr>
+          <p:cNvPr id="4" name="Slide Number Placeholder 3">
+            <a:extLst>
+              <a:ext uri="{FF2B5EF4-FFF2-40B4-BE49-F238E27FC236}">
+                <a16:creationId xmlns:a16="http://schemas.microsoft.com/office/drawing/2014/main" id="{CC5544F2-9051-4CE9-A080-0D9AC7C93BB7}"/>
+              </a:ext>
+            </a:extLst>
+          </p:cNvPr>
+          <p:cNvSpPr>
+            <a:spLocks noGrp="1"/>
+          </p:cNvSpPr>
+          <p:nvPr>
+            <p:ph type="sldNum" idx="12"/>
+          </p:nvPr>
+        </p:nvSpPr>
+        <p:spPr/>
+        <p:txBody>
+          <a:bodyPr/>
+          <a:lstStyle/>
+          <a:p>
+            <a:pPr marL="0" lvl="0" indent="0" algn="r" rtl="0">
+              <a:spcBef>
+                <a:spcPts val="0"/>
+              </a:spcBef>
+              <a:spcAft>
+                <a:spcPts val="0"/>
+              </a:spcAft>
+              <a:buNone/>
+            </a:pPr>
+            <a:fld id="{00000000-1234-1234-1234-123412341234}" type="slidenum">
+              <a:rPr lang="en" smtClean="0"/>
+              <a:t>16</a:t>
+            </a:fld>
+            <a:endParaRPr lang="en"/>
+          </a:p>
+        </p:txBody>
+      </p:sp>
+    </p:spTree>
+    <p:extLst>
+      <p:ext uri="{BB962C8B-B14F-4D97-AF65-F5344CB8AC3E}">
+        <p14:creationId xmlns:p14="http://schemas.microsoft.com/office/powerpoint/2010/main" val="3977161341"/>
       </p:ext>
     </p:extLst>
   </p:cSld>
@@ -8079,124 +7889,6 @@
     <p:extLst>
       <p:ext uri="{BB962C8B-B14F-4D97-AF65-F5344CB8AC3E}">
         <p14:creationId xmlns:p14="http://schemas.microsoft.com/office/powerpoint/2010/main" val="1114858597"/>
-      </p:ext>
-    </p:extLst>
-  </p:cSld>
-  <p:clrMapOvr>
-    <a:masterClrMapping/>
-  </p:clrMapOvr>
-</p:sld>
-</file>
-
-<file path=ppt/slides/slide18.xml><?xml version="1.0" encoding="utf-8"?>
-<p:sld xmlns:a="http://schemas.openxmlformats.org/drawingml/2006/main" xmlns:r="http://schemas.openxmlformats.org/officeDocument/2006/relationships" xmlns:p="http://schemas.openxmlformats.org/presentationml/2006/main">
-  <p:cSld>
-    <p:spTree>
-      <p:nvGrpSpPr>
-        <p:cNvPr id="1" name=""/>
-        <p:cNvGrpSpPr/>
-        <p:nvPr/>
-      </p:nvGrpSpPr>
-      <p:grpSpPr>
-        <a:xfrm>
-          <a:off x="0" y="0"/>
-          <a:ext cx="0" cy="0"/>
-          <a:chOff x="0" y="0"/>
-          <a:chExt cx="0" cy="0"/>
-        </a:xfrm>
-      </p:grpSpPr>
-      <p:sp>
-        <p:nvSpPr>
-          <p:cNvPr id="2" name="Title 1">
-            <a:extLst>
-              <a:ext uri="{FF2B5EF4-FFF2-40B4-BE49-F238E27FC236}">
-                <a16:creationId xmlns:a16="http://schemas.microsoft.com/office/drawing/2014/main" id="{3DF1FB55-8D0E-48A4-9A2E-974EF48B28D2}"/>
-              </a:ext>
-            </a:extLst>
-          </p:cNvPr>
-          <p:cNvSpPr>
-            <a:spLocks noGrp="1"/>
-          </p:cNvSpPr>
-          <p:nvPr>
-            <p:ph type="title"/>
-          </p:nvPr>
-        </p:nvSpPr>
-        <p:spPr/>
-        <p:txBody>
-          <a:bodyPr/>
-          <a:lstStyle/>
-          <a:p>
-            <a:endParaRPr lang="en-US"/>
-          </a:p>
-        </p:txBody>
-      </p:sp>
-      <p:sp>
-        <p:nvSpPr>
-          <p:cNvPr id="3" name="Text Placeholder 2">
-            <a:extLst>
-              <a:ext uri="{FF2B5EF4-FFF2-40B4-BE49-F238E27FC236}">
-                <a16:creationId xmlns:a16="http://schemas.microsoft.com/office/drawing/2014/main" id="{5E31D25E-8A09-4856-B0C6-F65B7E350D8C}"/>
-              </a:ext>
-            </a:extLst>
-          </p:cNvPr>
-          <p:cNvSpPr>
-            <a:spLocks noGrp="1"/>
-          </p:cNvSpPr>
-          <p:nvPr>
-            <p:ph type="body" idx="1"/>
-          </p:nvPr>
-        </p:nvSpPr>
-        <p:spPr/>
-        <p:txBody>
-          <a:bodyPr/>
-          <a:lstStyle/>
-          <a:p>
-            <a:endParaRPr lang="en-US"/>
-          </a:p>
-        </p:txBody>
-      </p:sp>
-      <p:sp>
-        <p:nvSpPr>
-          <p:cNvPr id="4" name="Slide Number Placeholder 3">
-            <a:extLst>
-              <a:ext uri="{FF2B5EF4-FFF2-40B4-BE49-F238E27FC236}">
-                <a16:creationId xmlns:a16="http://schemas.microsoft.com/office/drawing/2014/main" id="{7B3E3925-DA6B-4678-A493-B25AC7D3F226}"/>
-              </a:ext>
-            </a:extLst>
-          </p:cNvPr>
-          <p:cNvSpPr>
-            <a:spLocks noGrp="1"/>
-          </p:cNvSpPr>
-          <p:nvPr>
-            <p:ph type="sldNum" idx="12"/>
-          </p:nvPr>
-        </p:nvSpPr>
-        <p:spPr/>
-        <p:txBody>
-          <a:bodyPr/>
-          <a:lstStyle/>
-          <a:p>
-            <a:pPr marL="0" lvl="0" indent="0" algn="r" rtl="0">
-              <a:spcBef>
-                <a:spcPts val="0"/>
-              </a:spcBef>
-              <a:spcAft>
-                <a:spcPts val="0"/>
-              </a:spcAft>
-              <a:buNone/>
-            </a:pPr>
-            <a:fld id="{00000000-1234-1234-1234-123412341234}" type="slidenum">
-              <a:rPr lang="en" smtClean="0"/>
-              <a:t>18</a:t>
-            </a:fld>
-            <a:endParaRPr lang="en"/>
-          </a:p>
-        </p:txBody>
-      </p:sp>
-    </p:spTree>
-    <p:extLst>
-      <p:ext uri="{BB962C8B-B14F-4D97-AF65-F5344CB8AC3E}">
-        <p14:creationId xmlns:p14="http://schemas.microsoft.com/office/powerpoint/2010/main" val="3457516022"/>
       </p:ext>
     </p:extLst>
   </p:cSld>
@@ -8279,7 +7971,7 @@
           <a:p>
             <a:r>
               <a:rPr lang="en-US" sz="1200" dirty="0"/>
-              <a:t>Our team wanted to tell the story of covid-19 and the effects of mask use, income and healthcare cost. </a:t>
+              <a:t>Our team wanted to tell the story of covid-19 in the United States and the effects of mask use, income and healthcare cost on infections and deaths. </a:t>
             </a:r>
           </a:p>
           <a:p>
@@ -8292,14 +7984,7 @@
             <a:pPr lvl="1"/>
             <a:r>
               <a:rPr lang="en-US" sz="1200" dirty="0"/>
-              <a:t>What is the correlation between Covid-19 infections and deaths?</a:t>
-            </a:r>
-          </a:p>
-          <a:p>
-            <a:pPr lvl="1"/>
-            <a:r>
-              <a:rPr lang="en-US" sz="1200" dirty="0"/>
-              <a:t>How strong is the relationship between COVID19 infections and deaths? (Behrouz)</a:t>
+              <a:t>How strong is the relationship between COVID19 infections and deaths?</a:t>
             </a:r>
           </a:p>
           <a:p>
@@ -8313,7 +7998,7 @@
             <a:pPr lvl="1"/>
             <a:r>
               <a:rPr lang="en-US" sz="1200" dirty="0"/>
-              <a:t>Do states with the higher uninsured healthcare rates have higher covid-19 infections and/or mortality rates? </a:t>
+              <a:t>Do states with higher uninsured healthcare rates have higher covid-19 infections and/or mortality rates? </a:t>
             </a:r>
           </a:p>
           <a:p>
@@ -8327,7 +8012,7 @@
             <a:pPr lvl="1"/>
             <a:r>
               <a:rPr lang="en-US" sz="1200" dirty="0"/>
-              <a:t>Do higher mask use correlate to income levels?</a:t>
+              <a:t>Does higher mask use correlate to income levels?</a:t>
             </a:r>
           </a:p>
           <a:p>
@@ -8678,141 +8363,6 @@
 <file path=ppt/slides/slide5.xml><?xml version="1.0" encoding="utf-8"?>
 <p:sld xmlns:a="http://schemas.openxmlformats.org/drawingml/2006/main" xmlns:r="http://schemas.openxmlformats.org/officeDocument/2006/relationships" xmlns:p="http://schemas.openxmlformats.org/presentationml/2006/main">
   <p:cSld>
-    <p:bg>
-      <p:bgPr>
-        <a:solidFill>
-          <a:schemeClr val="accent1"/>
-        </a:solidFill>
-        <a:effectLst/>
-      </p:bgPr>
-    </p:bg>
-    <p:spTree>
-      <p:nvGrpSpPr>
-        <p:cNvPr id="1" name=""/>
-        <p:cNvGrpSpPr/>
-        <p:nvPr/>
-      </p:nvGrpSpPr>
-      <p:grpSpPr>
-        <a:xfrm>
-          <a:off x="0" y="0"/>
-          <a:ext cx="0" cy="0"/>
-          <a:chOff x="0" y="0"/>
-          <a:chExt cx="0" cy="0"/>
-        </a:xfrm>
-      </p:grpSpPr>
-      <p:sp>
-        <p:nvSpPr>
-          <p:cNvPr id="2" name="Title 1">
-            <a:extLst>
-              <a:ext uri="{FF2B5EF4-FFF2-40B4-BE49-F238E27FC236}">
-                <a16:creationId xmlns:a16="http://schemas.microsoft.com/office/drawing/2014/main" id="{48A17890-F76B-4A74-BFE6-467F72DB7F2D}"/>
-              </a:ext>
-            </a:extLst>
-          </p:cNvPr>
-          <p:cNvSpPr>
-            <a:spLocks noGrp="1"/>
-          </p:cNvSpPr>
-          <p:nvPr>
-            <p:ph type="title"/>
-          </p:nvPr>
-        </p:nvSpPr>
-        <p:spPr/>
-        <p:txBody>
-          <a:bodyPr/>
-          <a:lstStyle/>
-          <a:p>
-            <a:r>
-              <a:rPr lang="en" dirty="0"/>
-              <a:t>Covid-19 Infections and Deaths</a:t>
-            </a:r>
-            <a:endParaRPr lang="en-US" dirty="0"/>
-          </a:p>
-        </p:txBody>
-      </p:sp>
-      <p:sp>
-        <p:nvSpPr>
-          <p:cNvPr id="4" name="Slide Number Placeholder 3">
-            <a:extLst>
-              <a:ext uri="{FF2B5EF4-FFF2-40B4-BE49-F238E27FC236}">
-                <a16:creationId xmlns:a16="http://schemas.microsoft.com/office/drawing/2014/main" id="{81B15A48-6093-4B3E-A4B8-1409A080645F}"/>
-              </a:ext>
-            </a:extLst>
-          </p:cNvPr>
-          <p:cNvSpPr>
-            <a:spLocks noGrp="1"/>
-          </p:cNvSpPr>
-          <p:nvPr>
-            <p:ph type="sldNum" idx="12"/>
-          </p:nvPr>
-        </p:nvSpPr>
-        <p:spPr/>
-        <p:txBody>
-          <a:bodyPr/>
-          <a:lstStyle/>
-          <a:p>
-            <a:pPr marL="0" lvl="0" indent="0" algn="r" rtl="0">
-              <a:spcBef>
-                <a:spcPts val="0"/>
-              </a:spcBef>
-              <a:spcAft>
-                <a:spcPts val="0"/>
-              </a:spcAft>
-              <a:buNone/>
-            </a:pPr>
-            <a:fld id="{00000000-1234-1234-1234-123412341234}" type="slidenum">
-              <a:rPr lang="en" smtClean="0"/>
-              <a:t>5</a:t>
-            </a:fld>
-            <a:endParaRPr lang="en"/>
-          </a:p>
-        </p:txBody>
-      </p:sp>
-      <p:pic>
-        <p:nvPicPr>
-          <p:cNvPr id="10" name="Picture 9">
-            <a:extLst>
-              <a:ext uri="{FF2B5EF4-FFF2-40B4-BE49-F238E27FC236}">
-                <a16:creationId xmlns:a16="http://schemas.microsoft.com/office/drawing/2014/main" id="{F11D3440-B8C7-475C-BF5D-8157FB94302D}"/>
-              </a:ext>
-            </a:extLst>
-          </p:cNvPr>
-          <p:cNvPicPr>
-            <a:picLocks noChangeAspect="1"/>
-          </p:cNvPicPr>
-          <p:nvPr/>
-        </p:nvPicPr>
-        <p:blipFill>
-          <a:blip r:embed="rId2"/>
-          <a:stretch>
-            <a:fillRect/>
-          </a:stretch>
-        </p:blipFill>
-        <p:spPr>
-          <a:xfrm>
-            <a:off x="264839" y="800678"/>
-            <a:ext cx="8139545" cy="4069773"/>
-          </a:xfrm>
-          <a:prstGeom prst="rect">
-            <a:avLst/>
-          </a:prstGeom>
-        </p:spPr>
-      </p:pic>
-    </p:spTree>
-    <p:extLst>
-      <p:ext uri="{BB962C8B-B14F-4D97-AF65-F5344CB8AC3E}">
-        <p14:creationId xmlns:p14="http://schemas.microsoft.com/office/powerpoint/2010/main" val="630295975"/>
-      </p:ext>
-    </p:extLst>
-  </p:cSld>
-  <p:clrMapOvr>
-    <a:masterClrMapping/>
-  </p:clrMapOvr>
-</p:sld>
-</file>
-
-<file path=ppt/slides/slide6.xml><?xml version="1.0" encoding="utf-8"?>
-<p:sld xmlns:a="http://schemas.openxmlformats.org/drawingml/2006/main" xmlns:r="http://schemas.openxmlformats.org/officeDocument/2006/relationships" xmlns:p="http://schemas.openxmlformats.org/presentationml/2006/main">
-  <p:cSld>
     <p:spTree>
       <p:nvGrpSpPr>
         <p:cNvPr id="1" name=""/>
@@ -8888,7 +8438,7 @@
             </a:pPr>
             <a:fld id="{00000000-1234-1234-1234-123412341234}" type="slidenum">
               <a:rPr lang="en" smtClean="0"/>
-              <a:t>6</a:t>
+              <a:t>5</a:t>
             </a:fld>
             <a:endParaRPr lang="en"/>
           </a:p>
@@ -10638,7 +10188,7 @@
 </p:sld>
 </file>
 
-<file path=ppt/slides/slide7.xml><?xml version="1.0" encoding="utf-8"?>
+<file path=ppt/slides/slide6.xml><?xml version="1.0" encoding="utf-8"?>
 <p:sld xmlns:a="http://schemas.openxmlformats.org/drawingml/2006/main" xmlns:r="http://schemas.openxmlformats.org/officeDocument/2006/relationships" xmlns:p="http://schemas.openxmlformats.org/presentationml/2006/main">
   <p:cSld>
     <p:spTree>
@@ -10716,7 +10266,7 @@
             </a:pPr>
             <a:fld id="{00000000-1234-1234-1234-123412341234}" type="slidenum">
               <a:rPr lang="en" smtClean="0"/>
-              <a:t>7</a:t>
+              <a:t>6</a:t>
             </a:fld>
             <a:endParaRPr lang="en"/>
           </a:p>
@@ -10750,7 +10300,6 @@
           <a:prstGeom prst="rect">
             <a:avLst/>
           </a:prstGeom>
-          <a:noFill/>
         </p:spPr>
       </p:pic>
     </p:spTree>
@@ -10766,7 +10315,7 @@
 </p:sld>
 </file>
 
-<file path=ppt/slides/slide8.xml><?xml version="1.0" encoding="utf-8"?>
+<file path=ppt/slides/slide7.xml><?xml version="1.0" encoding="utf-8"?>
 <p:sld xmlns:a="http://schemas.openxmlformats.org/drawingml/2006/main" xmlns:r="http://schemas.openxmlformats.org/officeDocument/2006/relationships" xmlns:p="http://schemas.openxmlformats.org/presentationml/2006/main">
   <p:cSld>
     <p:spTree>
@@ -10819,7 +10368,7 @@
             </a:pPr>
             <a:r>
               <a:rPr lang="en" dirty="0"/>
-              <a:t>Covid-19 and Healthcase Costs</a:t>
+              <a:t>Covid-19 and Healthcare Costs</a:t>
             </a:r>
             <a:endParaRPr dirty="0"/>
           </a:p>
@@ -10876,7 +10425,7 @@
 </p:sld>
 </file>
 
-<file path=ppt/slides/slide9.xml><?xml version="1.0" encoding="utf-8"?>
+<file path=ppt/slides/slide8.xml><?xml version="1.0" encoding="utf-8"?>
 <p:sld xmlns:a="http://schemas.openxmlformats.org/drawingml/2006/main" xmlns:r="http://schemas.openxmlformats.org/officeDocument/2006/relationships" xmlns:p="http://schemas.openxmlformats.org/presentationml/2006/main">
   <p:cSld>
     <p:spTree>
@@ -10954,7 +10503,7 @@
             </a:pPr>
             <a:fld id="{00000000-1234-1234-1234-123412341234}" type="slidenum">
               <a:rPr lang="en" smtClean="0"/>
-              <a:t>9</a:t>
+              <a:t>8</a:t>
             </a:fld>
             <a:endParaRPr lang="en"/>
           </a:p>
@@ -10994,6 +10543,167 @@
     <p:extLst>
       <p:ext uri="{BB962C8B-B14F-4D97-AF65-F5344CB8AC3E}">
         <p14:creationId xmlns:p14="http://schemas.microsoft.com/office/powerpoint/2010/main" val="96204283"/>
+      </p:ext>
+    </p:extLst>
+  </p:cSld>
+  <p:clrMapOvr>
+    <a:masterClrMapping/>
+  </p:clrMapOvr>
+</p:sld>
+</file>
+
+<file path=ppt/slides/slide9.xml><?xml version="1.0" encoding="utf-8"?>
+<p:sld xmlns:a="http://schemas.openxmlformats.org/drawingml/2006/main" xmlns:r="http://schemas.openxmlformats.org/officeDocument/2006/relationships" xmlns:p="http://schemas.openxmlformats.org/presentationml/2006/main">
+  <p:cSld>
+    <p:spTree>
+      <p:nvGrpSpPr>
+        <p:cNvPr id="1" name=""/>
+        <p:cNvGrpSpPr/>
+        <p:nvPr/>
+      </p:nvGrpSpPr>
+      <p:grpSpPr>
+        <a:xfrm>
+          <a:off x="0" y="0"/>
+          <a:ext cx="0" cy="0"/>
+          <a:chOff x="0" y="0"/>
+          <a:chExt cx="0" cy="0"/>
+        </a:xfrm>
+      </p:grpSpPr>
+      <p:sp>
+        <p:nvSpPr>
+          <p:cNvPr id="2" name="Title 1">
+            <a:extLst>
+              <a:ext uri="{FF2B5EF4-FFF2-40B4-BE49-F238E27FC236}">
+                <a16:creationId xmlns:a16="http://schemas.microsoft.com/office/drawing/2014/main" id="{5EBAAEE0-3B4E-408B-9FAC-7BBF803AA414}"/>
+              </a:ext>
+            </a:extLst>
+          </p:cNvPr>
+          <p:cNvSpPr>
+            <a:spLocks noGrp="1"/>
+          </p:cNvSpPr>
+          <p:nvPr>
+            <p:ph type="title"/>
+          </p:nvPr>
+        </p:nvSpPr>
+        <p:spPr>
+          <a:xfrm>
+            <a:off x="514799" y="130280"/>
+            <a:ext cx="8372891" cy="665100"/>
+          </a:xfrm>
+        </p:spPr>
+        <p:txBody>
+          <a:bodyPr/>
+          <a:lstStyle/>
+          <a:p>
+            <a:r>
+              <a:rPr lang="en-US" sz="3200" dirty="0"/>
+              <a:t>Covid-19 Healthcare Costs vs Infection and Mortality</a:t>
+            </a:r>
+          </a:p>
+        </p:txBody>
+      </p:sp>
+      <p:sp>
+        <p:nvSpPr>
+          <p:cNvPr id="4" name="Slide Number Placeholder 3">
+            <a:extLst>
+              <a:ext uri="{FF2B5EF4-FFF2-40B4-BE49-F238E27FC236}">
+                <a16:creationId xmlns:a16="http://schemas.microsoft.com/office/drawing/2014/main" id="{2EB182E7-B6BC-4093-A283-0CFCD6D261D9}"/>
+              </a:ext>
+            </a:extLst>
+          </p:cNvPr>
+          <p:cNvSpPr>
+            <a:spLocks noGrp="1"/>
+          </p:cNvSpPr>
+          <p:nvPr>
+            <p:ph type="sldNum" idx="12"/>
+          </p:nvPr>
+        </p:nvSpPr>
+        <p:spPr/>
+        <p:txBody>
+          <a:bodyPr/>
+          <a:lstStyle/>
+          <a:p>
+            <a:pPr marL="0" lvl="0" indent="0" algn="r" rtl="0">
+              <a:spcBef>
+                <a:spcPts val="0"/>
+              </a:spcBef>
+              <a:spcAft>
+                <a:spcPts val="0"/>
+              </a:spcAft>
+              <a:buNone/>
+            </a:pPr>
+            <a:fld id="{00000000-1234-1234-1234-123412341234}" type="slidenum">
+              <a:rPr lang="en" smtClean="0"/>
+              <a:t>9</a:t>
+            </a:fld>
+            <a:endParaRPr lang="en"/>
+          </a:p>
+        </p:txBody>
+      </p:sp>
+      <p:pic>
+        <p:nvPicPr>
+          <p:cNvPr id="11" name="Picture 10" descr="A screenshot of a cell phone&#10;&#10;Description automatically generated">
+            <a:extLst>
+              <a:ext uri="{FF2B5EF4-FFF2-40B4-BE49-F238E27FC236}">
+                <a16:creationId xmlns:a16="http://schemas.microsoft.com/office/drawing/2014/main" id="{8FEE5BCC-9870-4544-83B1-B072562F267B}"/>
+              </a:ext>
+            </a:extLst>
+          </p:cNvPr>
+          <p:cNvPicPr>
+            <a:picLocks noChangeAspect="1"/>
+          </p:cNvPicPr>
+          <p:nvPr/>
+        </p:nvPicPr>
+        <p:blipFill>
+          <a:blip r:embed="rId2"/>
+          <a:stretch>
+            <a:fillRect/>
+          </a:stretch>
+        </p:blipFill>
+        <p:spPr>
+          <a:xfrm>
+            <a:off x="219663" y="911143"/>
+            <a:ext cx="4161468" cy="2972477"/>
+          </a:xfrm>
+          <a:prstGeom prst="rect">
+            <a:avLst/>
+          </a:prstGeom>
+        </p:spPr>
+      </p:pic>
+      <p:pic>
+        <p:nvPicPr>
+          <p:cNvPr id="13" name="Picture 12" descr="A screenshot of a cell phone&#10;&#10;Description automatically generated">
+            <a:extLst>
+              <a:ext uri="{FF2B5EF4-FFF2-40B4-BE49-F238E27FC236}">
+                <a16:creationId xmlns:a16="http://schemas.microsoft.com/office/drawing/2014/main" id="{53BC7A88-A606-45D5-8865-651B82CECBF8}"/>
+              </a:ext>
+            </a:extLst>
+          </p:cNvPr>
+          <p:cNvPicPr>
+            <a:picLocks noChangeAspect="1"/>
+          </p:cNvPicPr>
+          <p:nvPr/>
+        </p:nvPicPr>
+        <p:blipFill>
+          <a:blip r:embed="rId3"/>
+          <a:stretch>
+            <a:fillRect/>
+          </a:stretch>
+        </p:blipFill>
+        <p:spPr>
+          <a:xfrm>
+            <a:off x="4648564" y="911143"/>
+            <a:ext cx="4161468" cy="2972477"/>
+          </a:xfrm>
+          <a:prstGeom prst="rect">
+            <a:avLst/>
+          </a:prstGeom>
+        </p:spPr>
+      </p:pic>
+    </p:spTree>
+    <p:extLst>
+      <p:ext uri="{BB962C8B-B14F-4D97-AF65-F5344CB8AC3E}">
+        <p14:creationId xmlns:p14="http://schemas.microsoft.com/office/powerpoint/2010/main" val="522767935"/>
       </p:ext>
     </p:extLst>
   </p:cSld>

</xml_diff>